<commit_message>
L3 - Classes abstraites et héritage
</commit_message>
<xml_diff>
--- a/Diagramme de classe/L3 - Classes abstraites et héritage/L3 - Classes abstraites et héritage.pptx
+++ b/Diagramme de classe/L3 - Classes abstraites et héritage/L3 - Classes abstraites et héritage.pptx
@@ -5,14 +5,13 @@
     <p:sldMasterId id="2147483648" r:id="rId1"/>
   </p:sldMasterIdLst>
   <p:notesMasterIdLst>
-    <p:notesMasterId r:id="rId7"/>
+    <p:notesMasterId r:id="rId6"/>
   </p:notesMasterIdLst>
   <p:sldIdLst>
     <p:sldId id="256" r:id="rId2"/>
     <p:sldId id="257" r:id="rId3"/>
     <p:sldId id="261" r:id="rId4"/>
-    <p:sldId id="262" r:id="rId5"/>
-    <p:sldId id="263" r:id="rId6"/>
+    <p:sldId id="263" r:id="rId5"/>
   </p:sldIdLst>
   <p:sldSz cx="9144000" cy="6858000" type="screen4x3"/>
   <p:notesSz cx="6858000" cy="9144000"/>
@@ -196,7 +195,7 @@
           <a:p>
             <a:fld id="{A25623AB-641E-4BE5-8BB8-E9ECD9F62C0A}" type="datetimeFigureOut">
               <a:rPr lang="fr-FR" smtClean="0"/>
-              <a:t>24/01/2014</a:t>
+              <a:t>27.01.14</a:t>
             </a:fld>
             <a:endParaRPr lang="fr-CH"/>
           </a:p>
@@ -357,13 +356,18 @@
           <a:p>
             <a:fld id="{1DCE5F11-534C-45A7-8A38-E52E47A254FF}" type="slidenum">
               <a:rPr lang="fr-CH" smtClean="0"/>
-              <a:t>‹N°›</a:t>
+              <a:t>‹#›</a:t>
             </a:fld>
             <a:endParaRPr lang="fr-CH"/>
           </a:p>
         </p:txBody>
       </p:sp>
     </p:spTree>
+    <p:extLst>
+      <p:ext uri="{BB962C8B-B14F-4D97-AF65-F5344CB8AC3E}">
+        <p14:creationId xmlns:p14="http://schemas.microsoft.com/office/powerpoint/2010/main" val="291982883"/>
+      </p:ext>
+    </p:extLst>
   </p:cSld>
   <p:clrMap bg1="lt1" tx1="dk1" bg2="lt2" tx2="dk2" accent1="accent1" accent2="accent2" accent3="accent3" accent4="accent4" accent5="accent5" accent6="accent6" hlink="hlink" folHlink="folHlink"/>
   <p:notesStyle>
@@ -772,7 +776,7 @@
             <a:fld id="{AA309A6D-C09C-4548-B29A-6CF363A7E532}" type="datetimeFigureOut">
               <a:rPr lang="fr-FR" smtClean="0"/>
               <a:pPr/>
-              <a:t>24/01/2014</a:t>
+              <a:t>27.01.14</a:t>
             </a:fld>
             <a:endParaRPr lang="fr-BE"/>
           </a:p>
@@ -815,7 +819,7 @@
             <a:fld id="{CF4668DC-857F-487D-BFFA-8C0CA5037977}" type="slidenum">
               <a:rPr lang="fr-BE" smtClean="0"/>
               <a:pPr/>
-              <a:t>‹N°›</a:t>
+              <a:t>‹#›</a:t>
             </a:fld>
             <a:endParaRPr lang="fr-BE"/>
           </a:p>
@@ -939,7 +943,7 @@
             <a:fld id="{AA309A6D-C09C-4548-B29A-6CF363A7E532}" type="datetimeFigureOut">
               <a:rPr lang="fr-FR" smtClean="0"/>
               <a:pPr/>
-              <a:t>24/01/2014</a:t>
+              <a:t>27.01.14</a:t>
             </a:fld>
             <a:endParaRPr lang="fr-BE"/>
           </a:p>
@@ -982,7 +986,7 @@
             <a:fld id="{CF4668DC-857F-487D-BFFA-8C0CA5037977}" type="slidenum">
               <a:rPr lang="fr-BE" smtClean="0"/>
               <a:pPr/>
-              <a:t>‹N°›</a:t>
+              <a:t>‹#›</a:t>
             </a:fld>
             <a:endParaRPr lang="fr-BE"/>
           </a:p>
@@ -1116,7 +1120,7 @@
             <a:fld id="{AA309A6D-C09C-4548-B29A-6CF363A7E532}" type="datetimeFigureOut">
               <a:rPr lang="fr-FR" smtClean="0"/>
               <a:pPr/>
-              <a:t>24/01/2014</a:t>
+              <a:t>27.01.14</a:t>
             </a:fld>
             <a:endParaRPr lang="fr-BE"/>
           </a:p>
@@ -1159,7 +1163,7 @@
             <a:fld id="{CF4668DC-857F-487D-BFFA-8C0CA5037977}" type="slidenum">
               <a:rPr lang="fr-BE" smtClean="0"/>
               <a:pPr/>
-              <a:t>‹N°›</a:t>
+              <a:t>‹#›</a:t>
             </a:fld>
             <a:endParaRPr lang="fr-BE"/>
           </a:p>
@@ -1283,7 +1287,7 @@
             <a:fld id="{AA309A6D-C09C-4548-B29A-6CF363A7E532}" type="datetimeFigureOut">
               <a:rPr lang="fr-FR" smtClean="0"/>
               <a:pPr/>
-              <a:t>24/01/2014</a:t>
+              <a:t>27.01.14</a:t>
             </a:fld>
             <a:endParaRPr lang="fr-BE"/>
           </a:p>
@@ -1326,7 +1330,7 @@
             <a:fld id="{CF4668DC-857F-487D-BFFA-8C0CA5037977}" type="slidenum">
               <a:rPr lang="fr-BE" smtClean="0"/>
               <a:pPr/>
-              <a:t>‹N°›</a:t>
+              <a:t>‹#›</a:t>
             </a:fld>
             <a:endParaRPr lang="fr-BE"/>
           </a:p>
@@ -1526,7 +1530,7 @@
             <a:fld id="{AA309A6D-C09C-4548-B29A-6CF363A7E532}" type="datetimeFigureOut">
               <a:rPr lang="fr-FR" smtClean="0"/>
               <a:pPr/>
-              <a:t>24/01/2014</a:t>
+              <a:t>27.01.14</a:t>
             </a:fld>
             <a:endParaRPr lang="fr-BE"/>
           </a:p>
@@ -1569,7 +1573,7 @@
             <a:fld id="{CF4668DC-857F-487D-BFFA-8C0CA5037977}" type="slidenum">
               <a:rPr lang="fr-BE" smtClean="0"/>
               <a:pPr/>
-              <a:t>‹N°›</a:t>
+              <a:t>‹#›</a:t>
             </a:fld>
             <a:endParaRPr lang="fr-BE"/>
           </a:p>
@@ -1811,7 +1815,7 @@
             <a:fld id="{AA309A6D-C09C-4548-B29A-6CF363A7E532}" type="datetimeFigureOut">
               <a:rPr lang="fr-FR" smtClean="0"/>
               <a:pPr/>
-              <a:t>24/01/2014</a:t>
+              <a:t>27.01.14</a:t>
             </a:fld>
             <a:endParaRPr lang="fr-BE"/>
           </a:p>
@@ -1854,7 +1858,7 @@
             <a:fld id="{CF4668DC-857F-487D-BFFA-8C0CA5037977}" type="slidenum">
               <a:rPr lang="fr-BE" smtClean="0"/>
               <a:pPr/>
-              <a:t>‹N°›</a:t>
+              <a:t>‹#›</a:t>
             </a:fld>
             <a:endParaRPr lang="fr-BE"/>
           </a:p>
@@ -2230,7 +2234,7 @@
             <a:fld id="{AA309A6D-C09C-4548-B29A-6CF363A7E532}" type="datetimeFigureOut">
               <a:rPr lang="fr-FR" smtClean="0"/>
               <a:pPr/>
-              <a:t>24/01/2014</a:t>
+              <a:t>27.01.14</a:t>
             </a:fld>
             <a:endParaRPr lang="fr-BE"/>
           </a:p>
@@ -2273,7 +2277,7 @@
             <a:fld id="{CF4668DC-857F-487D-BFFA-8C0CA5037977}" type="slidenum">
               <a:rPr lang="fr-BE" smtClean="0"/>
               <a:pPr/>
-              <a:t>‹N°›</a:t>
+              <a:t>‹#›</a:t>
             </a:fld>
             <a:endParaRPr lang="fr-BE"/>
           </a:p>
@@ -2345,7 +2349,7 @@
             <a:fld id="{AA309A6D-C09C-4548-B29A-6CF363A7E532}" type="datetimeFigureOut">
               <a:rPr lang="fr-FR" smtClean="0"/>
               <a:pPr/>
-              <a:t>24/01/2014</a:t>
+              <a:t>27.01.14</a:t>
             </a:fld>
             <a:endParaRPr lang="fr-BE"/>
           </a:p>
@@ -2388,7 +2392,7 @@
             <a:fld id="{CF4668DC-857F-487D-BFFA-8C0CA5037977}" type="slidenum">
               <a:rPr lang="fr-BE" smtClean="0"/>
               <a:pPr/>
-              <a:t>‹N°›</a:t>
+              <a:t>‹#›</a:t>
             </a:fld>
             <a:endParaRPr lang="fr-BE"/>
           </a:p>
@@ -2437,7 +2441,7 @@
             <a:fld id="{AA309A6D-C09C-4548-B29A-6CF363A7E532}" type="datetimeFigureOut">
               <a:rPr lang="fr-FR" smtClean="0"/>
               <a:pPr/>
-              <a:t>24/01/2014</a:t>
+              <a:t>27.01.14</a:t>
             </a:fld>
             <a:endParaRPr lang="fr-BE"/>
           </a:p>
@@ -2480,7 +2484,7 @@
             <a:fld id="{CF4668DC-857F-487D-BFFA-8C0CA5037977}" type="slidenum">
               <a:rPr lang="fr-BE" smtClean="0"/>
               <a:pPr/>
-              <a:t>‹N°›</a:t>
+              <a:t>‹#›</a:t>
             </a:fld>
             <a:endParaRPr lang="fr-BE"/>
           </a:p>
@@ -2711,7 +2715,7 @@
             <a:fld id="{AA309A6D-C09C-4548-B29A-6CF363A7E532}" type="datetimeFigureOut">
               <a:rPr lang="fr-FR" smtClean="0"/>
               <a:pPr/>
-              <a:t>24/01/2014</a:t>
+              <a:t>27.01.14</a:t>
             </a:fld>
             <a:endParaRPr lang="fr-BE"/>
           </a:p>
@@ -2754,7 +2758,7 @@
             <a:fld id="{CF4668DC-857F-487D-BFFA-8C0CA5037977}" type="slidenum">
               <a:rPr lang="fr-BE" smtClean="0"/>
               <a:pPr/>
-              <a:t>‹N°›</a:t>
+              <a:t>‹#›</a:t>
             </a:fld>
             <a:endParaRPr lang="fr-BE"/>
           </a:p>
@@ -2961,7 +2965,7 @@
             <a:fld id="{AA309A6D-C09C-4548-B29A-6CF363A7E532}" type="datetimeFigureOut">
               <a:rPr lang="fr-FR" smtClean="0"/>
               <a:pPr/>
-              <a:t>24/01/2014</a:t>
+              <a:t>27.01.14</a:t>
             </a:fld>
             <a:endParaRPr lang="fr-BE"/>
           </a:p>
@@ -3004,7 +3008,7 @@
             <a:fld id="{CF4668DC-857F-487D-BFFA-8C0CA5037977}" type="slidenum">
               <a:rPr lang="fr-BE" smtClean="0"/>
               <a:pPr/>
-              <a:t>‹N°›</a:t>
+              <a:t>‹#›</a:t>
             </a:fld>
             <a:endParaRPr lang="fr-BE"/>
           </a:p>
@@ -3171,7 +3175,7 @@
             <a:fld id="{AA309A6D-C09C-4548-B29A-6CF363A7E532}" type="datetimeFigureOut">
               <a:rPr lang="fr-FR" smtClean="0"/>
               <a:pPr/>
-              <a:t>24/01/2014</a:t>
+              <a:t>27.01.14</a:t>
             </a:fld>
             <a:endParaRPr lang="fr-BE"/>
           </a:p>
@@ -3250,7 +3254,7 @@
             <a:fld id="{CF4668DC-857F-487D-BFFA-8C0CA5037977}" type="slidenum">
               <a:rPr lang="fr-BE" smtClean="0"/>
               <a:pPr/>
-              <a:t>‹N°›</a:t>
+              <a:t>‹#›</a:t>
             </a:fld>
             <a:endParaRPr lang="fr-BE"/>
           </a:p>
@@ -3581,12 +3585,20 @@
           <a:lstStyle/>
           <a:p>
             <a:r>
+              <a:rPr lang="fr-CH" dirty="0"/>
+              <a:t>3</a:t>
+            </a:r>
+            <a:r>
               <a:rPr lang="fr-CH" dirty="0" smtClean="0"/>
-              <a:t>1 </a:t>
+              <a:t> </a:t>
             </a:r>
             <a:r>
               <a:rPr lang="fr-CH" dirty="0" smtClean="0"/>
-              <a:t>– Méthodes et visibilité</a:t>
+              <a:t>– </a:t>
+            </a:r>
+            <a:r>
+              <a:rPr lang="fr-CH" dirty="0" smtClean="0"/>
+              <a:t>Classes abstraites et héritage</a:t>
             </a:r>
             <a:endParaRPr lang="fr-CH" dirty="0"/>
           </a:p>
@@ -3597,6 +3609,13 @@
   <p:clrMapOvr>
     <a:masterClrMapping/>
   </p:clrMapOvr>
+  <p:timing>
+    <p:tnLst>
+      <p:par>
+        <p:cTn xmlns:p14="http://schemas.microsoft.com/office/powerpoint/2010/main" id="1" dur="indefinite" restart="never" nodeType="tmRoot"/>
+      </p:par>
+    </p:tnLst>
+  </p:timing>
 </p:sld>
 </file>
 
@@ -3634,7 +3653,7 @@
           <a:p>
             <a:r>
               <a:rPr lang="fr-CH" dirty="0" smtClean="0"/>
-              <a:t>Méthodes</a:t>
+              <a:t>Classes abstraites</a:t>
             </a:r>
             <a:endParaRPr lang="fr-CH" dirty="0"/>
           </a:p>
@@ -3658,245 +3677,81 @@
         </p:spPr>
         <p:txBody>
           <a:bodyPr>
-            <a:normAutofit fontScale="85000" lnSpcReduction="20000"/>
+            <a:normAutofit/>
           </a:bodyPr>
           <a:lstStyle/>
           <a:p>
             <a:r>
+              <a:rPr lang="fr-CH" dirty="0"/>
+              <a:t>C</a:t>
+            </a:r>
+            <a:r>
               <a:rPr lang="fr-CH" dirty="0" smtClean="0"/>
-              <a:t>Méthodes dans le dernier compartiment</a:t>
-            </a:r>
+              <a:t>lasse abstraite: ne pas peux pas </a:t>
+            </a:r>
+            <a:r>
+              <a:rPr lang="fr-CH" dirty="0" smtClean="0"/>
+              <a:t>être « instanciée »</a:t>
+            </a:r>
+          </a:p>
+          <a:p>
+            <a:r>
+              <a:rPr lang="fr-CH" dirty="0" smtClean="0"/>
+              <a:t>UML: en italique</a:t>
+            </a:r>
+            <a:endParaRPr lang="fr-CH" dirty="0"/>
+          </a:p>
+          <a:p>
             <a:endParaRPr lang="fr-CH" dirty="0" smtClean="0"/>
           </a:p>
-          <a:p>
-            <a:r>
-              <a:rPr lang="fr-CH" dirty="0" smtClean="0"/>
-              <a:t>Syntaxe UML: </a:t>
-            </a:r>
-            <a:endParaRPr lang="fr-CH" dirty="0" smtClean="0"/>
-          </a:p>
-          <a:p>
-            <a:r>
-              <a:rPr lang="fr-CH" i="1" dirty="0" err="1" smtClean="0"/>
-              <a:t>nomMethode</a:t>
-            </a:r>
-            <a:r>
-              <a:rPr lang="fr-CH" i="1" dirty="0" smtClean="0"/>
-              <a:t>(</a:t>
-            </a:r>
-            <a:r>
-              <a:rPr lang="fr-CH" i="1" dirty="0" err="1" smtClean="0"/>
-              <a:t>nomParam:typeParam</a:t>
-            </a:r>
-            <a:r>
-              <a:rPr lang="fr-CH" i="1" dirty="0" smtClean="0"/>
-              <a:t>, …):</a:t>
-            </a:r>
-            <a:r>
-              <a:rPr lang="fr-CH" i="1" dirty="0" err="1" smtClean="0"/>
-              <a:t>typeRetour</a:t>
-            </a:r>
-            <a:endParaRPr lang="fr-CH" i="1" dirty="0" smtClean="0"/>
-          </a:p>
-          <a:p>
-            <a:r>
-              <a:rPr lang="fr-CH" dirty="0" smtClean="0"/>
-              <a:t>Syntaxe JAVA</a:t>
-            </a:r>
-            <a:r>
-              <a:rPr lang="fr-CH" dirty="0" smtClean="0"/>
-              <a:t>:</a:t>
-            </a:r>
-          </a:p>
-          <a:p>
-            <a:r>
-              <a:rPr lang="fr-CH" i="1" dirty="0" err="1" smtClean="0"/>
-              <a:t>typeRetour</a:t>
-            </a:r>
-            <a:r>
-              <a:rPr lang="fr-CH" i="1" dirty="0" smtClean="0"/>
-              <a:t> </a:t>
-            </a:r>
-            <a:r>
-              <a:rPr lang="fr-CH" i="1" dirty="0" err="1" smtClean="0"/>
-              <a:t>nomMethode</a:t>
-            </a:r>
-            <a:r>
-              <a:rPr lang="fr-CH" i="1" dirty="0" smtClean="0"/>
-              <a:t>(</a:t>
-            </a:r>
-            <a:r>
-              <a:rPr lang="fr-CH" i="1" dirty="0" err="1" smtClean="0"/>
-              <a:t>typeParam</a:t>
-            </a:r>
-            <a:r>
-              <a:rPr lang="fr-CH" i="1" dirty="0" smtClean="0"/>
-              <a:t> </a:t>
-            </a:r>
-            <a:r>
-              <a:rPr lang="fr-CH" i="1" dirty="0" err="1" smtClean="0"/>
-              <a:t>nomParam</a:t>
-            </a:r>
-            <a:r>
-              <a:rPr lang="fr-CH" i="1" dirty="0" smtClean="0"/>
-              <a:t>, …)</a:t>
-            </a:r>
-            <a:endParaRPr lang="fr-CH" i="1" dirty="0" smtClean="0"/>
-          </a:p>
-        </p:txBody>
-      </p:sp>
-      <p:sp>
-        <p:nvSpPr>
-          <p:cNvPr id="7" name="Espace réservé du contenu 2"/>
-          <p:cNvSpPr txBox="1">
-            <a:spLocks/>
-          </p:cNvSpPr>
+        </p:txBody>
+      </p:sp>
+      <p:pic>
+        <p:nvPicPr>
+          <p:cNvPr id="4" name="Picture 3"/>
+          <p:cNvPicPr>
+            <a:picLocks noChangeAspect="1"/>
+          </p:cNvPicPr>
           <p:nvPr/>
-        </p:nvSpPr>
+        </p:nvPicPr>
+        <p:blipFill>
+          <a:blip r:embed="rId2"/>
+          <a:stretch>
+            <a:fillRect/>
+          </a:stretch>
+        </p:blipFill>
         <p:spPr>
           <a:xfrm>
-            <a:off x="2214546" y="3500438"/>
-            <a:ext cx="1857388" cy="285752"/>
+            <a:off x="755577" y="1484784"/>
+            <a:ext cx="3109436" cy="1800200"/>
           </a:xfrm>
           <a:prstGeom prst="rect">
             <a:avLst/>
           </a:prstGeom>
         </p:spPr>
-        <p:txBody>
-          <a:bodyPr vert="horz" lIns="91440" tIns="45720" rIns="91440" bIns="45720" rtlCol="0">
-            <a:normAutofit lnSpcReduction="10000"/>
-          </a:bodyPr>
-          <a:lstStyle/>
-          <a:p>
-            <a:pPr marL="342900" marR="0" lvl="0" indent="-342900" algn="l" defTabSz="914400" rtl="0" eaLnBrk="1" fontAlgn="auto" latinLnBrk="0" hangingPunct="1">
-              <a:lnSpc>
-                <a:spcPct val="100000"/>
-              </a:lnSpc>
-              <a:spcBef>
-                <a:spcPct val="20000"/>
-              </a:spcBef>
-              <a:spcAft>
-                <a:spcPts val="0"/>
-              </a:spcAft>
-              <a:buClrTx/>
-              <a:buSzTx/>
-              <a:tabLst/>
-              <a:defRPr/>
-            </a:pPr>
-            <a:r>
-              <a:rPr lang="fr-CH" sz="1400" i="1" dirty="0" smtClean="0"/>
-              <a:t>Voir exemple « dc_1 »</a:t>
-            </a:r>
-            <a:endParaRPr kumimoji="0" lang="fr-CH" sz="1400" b="0" i="1" u="none" strike="noStrike" kern="1200" cap="none" spc="0" normalizeH="0" baseline="0" noProof="0" dirty="0">
-              <a:ln>
-                <a:noFill/>
-              </a:ln>
-              <a:solidFill>
-                <a:schemeClr val="tx1"/>
-              </a:solidFill>
-              <a:effectLst/>
-              <a:uLnTx/>
-              <a:uFillTx/>
-              <a:latin typeface="+mn-lt"/>
-              <a:ea typeface="+mn-ea"/>
-              <a:cs typeface="+mn-cs"/>
-            </a:endParaRPr>
-          </a:p>
-        </p:txBody>
-      </p:sp>
+      </p:pic>
       <p:pic>
         <p:nvPicPr>
-          <p:cNvPr id="1028" name="Picture 4" descr="PlantUML diagram"/>
+          <p:cNvPr id="5" name="Picture 4"/>
           <p:cNvPicPr>
-            <a:picLocks noChangeAspect="1" noChangeArrowheads="1"/>
-          </p:cNvPicPr>
-          <p:nvPr/>
-        </p:nvPicPr>
-        <p:blipFill>
-          <a:blip r:embed="rId2"/>
-          <a:srcRect/>
-          <a:stretch>
-            <a:fillRect/>
-          </a:stretch>
-        </p:blipFill>
-        <p:spPr bwMode="auto">
-          <a:xfrm>
-            <a:off x="928662" y="1428736"/>
-            <a:ext cx="3022374" cy="1428760"/>
-          </a:xfrm>
-          <a:prstGeom prst="rect">
-            <a:avLst/>
-          </a:prstGeom>
-          <a:noFill/>
-        </p:spPr>
-      </p:pic>
-      <p:cxnSp>
-        <p:nvCxnSpPr>
-          <p:cNvPr id="9" name="Connecteur droit avec flèche 8"/>
-          <p:cNvCxnSpPr/>
-          <p:nvPr/>
-        </p:nvCxnSpPr>
-        <p:spPr>
-          <a:xfrm rot="5400000" flipH="1" flipV="1">
-            <a:off x="1643836" y="2786058"/>
-            <a:ext cx="1356528" cy="1215240"/>
-          </a:xfrm>
-          <a:prstGeom prst="straightConnector1">
-            <a:avLst/>
-          </a:prstGeom>
-          <a:ln w="19050" cmpd="sng">
-            <a:solidFill>
-              <a:srgbClr val="FF0000"/>
-            </a:solidFill>
-            <a:tailEnd type="arrow"/>
-          </a:ln>
-        </p:spPr>
-        <p:style>
-          <a:lnRef idx="1">
-            <a:schemeClr val="accent1"/>
-          </a:lnRef>
-          <a:fillRef idx="0">
-            <a:schemeClr val="accent1"/>
-          </a:fillRef>
-          <a:effectRef idx="0">
-            <a:schemeClr val="accent1"/>
-          </a:effectRef>
-          <a:fontRef idx="minor">
-            <a:schemeClr val="tx1"/>
-          </a:fontRef>
-        </p:style>
-      </p:cxnSp>
-      <p:pic>
-        <p:nvPicPr>
-          <p:cNvPr id="1029" name="Picture 5"/>
-          <p:cNvPicPr>
-            <a:picLocks noChangeAspect="1" noChangeArrowheads="1"/>
+            <a:picLocks noChangeAspect="1"/>
           </p:cNvPicPr>
           <p:nvPr/>
         </p:nvPicPr>
         <p:blipFill>
           <a:blip r:embed="rId3"/>
-          <a:srcRect/>
           <a:stretch>
             <a:fillRect/>
           </a:stretch>
         </p:blipFill>
-        <p:spPr bwMode="auto">
+        <p:spPr>
           <a:xfrm>
-            <a:off x="4643438" y="1142984"/>
-            <a:ext cx="3643338" cy="2785427"/>
+            <a:off x="3851919" y="1556792"/>
+            <a:ext cx="4221299" cy="1872208"/>
           </a:xfrm>
           <a:prstGeom prst="rect">
             <a:avLst/>
           </a:prstGeom>
-          <a:noFill/>
-          <a:ln w="9525">
-            <a:noFill/>
-            <a:miter lim="800000"/>
-            <a:headEnd/>
-            <a:tailEnd/>
-          </a:ln>
-          <a:effectLst/>
         </p:spPr>
       </p:pic>
     </p:spTree>
@@ -3904,6 +3759,13 @@
   <p:clrMapOvr>
     <a:masterClrMapping/>
   </p:clrMapOvr>
+  <p:timing>
+    <p:tnLst>
+      <p:par>
+        <p:cTn xmlns:p14="http://schemas.microsoft.com/office/powerpoint/2010/main" id="1" dur="indefinite" restart="never" nodeType="tmRoot"/>
+      </p:par>
+    </p:tnLst>
+  </p:timing>
 </p:sld>
 </file>
 
@@ -3941,7 +3803,7 @@
           <a:p>
             <a:r>
               <a:rPr lang="fr-CH" dirty="0" smtClean="0"/>
-              <a:t>Visibilité</a:t>
+              <a:t>Héritage</a:t>
             </a:r>
             <a:endParaRPr lang="fr-CH" dirty="0"/>
           </a:p>
@@ -3970,143 +3832,83 @@
           <a:lstStyle/>
           <a:p>
             <a:r>
+              <a:rPr lang="fr-CH" dirty="0"/>
+              <a:t>L</a:t>
+            </a:r>
+            <a:r>
               <a:rPr lang="fr-CH" dirty="0" smtClean="0"/>
-              <a:t>« - » = « </a:t>
-            </a:r>
-            <a:r>
-              <a:rPr lang="fr-CH" dirty="0" err="1" smtClean="0"/>
-              <a:t>private</a:t>
+              <a:t>es classes </a:t>
+            </a:r>
+            <a:r>
+              <a:rPr lang="fr-CH" i="1" dirty="0" smtClean="0"/>
+              <a:t>GetBalance</a:t>
             </a:r>
             <a:r>
               <a:rPr lang="fr-CH" dirty="0" smtClean="0"/>
-              <a:t> »</a:t>
-            </a:r>
-          </a:p>
-          <a:p>
+              <a:t> et </a:t>
+            </a:r>
+            <a:r>
+              <a:rPr lang="fr-CH" i="1" dirty="0" smtClean="0"/>
+              <a:t>GetAccountHistory</a:t>
+            </a:r>
             <a:r>
               <a:rPr lang="fr-CH" dirty="0" smtClean="0"/>
-              <a:t>« + » = « public »</a:t>
-            </a:r>
-            <a:endParaRPr lang="fr-CH" dirty="0" smtClean="0"/>
-          </a:p>
-        </p:txBody>
-      </p:sp>
-      <p:sp>
-        <p:nvSpPr>
-          <p:cNvPr id="7" name="Espace réservé du contenu 2"/>
-          <p:cNvSpPr txBox="1">
-            <a:spLocks/>
-          </p:cNvSpPr>
+              <a:t> héritent de la classe </a:t>
+            </a:r>
+            <a:r>
+              <a:rPr lang="fr-CH" i="1" dirty="0" smtClean="0"/>
+              <a:t>Command</a:t>
+            </a:r>
+            <a:endParaRPr lang="fr-CH" i="1" dirty="0" smtClean="0"/>
+          </a:p>
+        </p:txBody>
+      </p:sp>
+      <p:pic>
+        <p:nvPicPr>
+          <p:cNvPr id="5" name="Picture 4"/>
+          <p:cNvPicPr>
+            <a:picLocks noChangeAspect="1"/>
+          </p:cNvPicPr>
           <p:nvPr/>
-        </p:nvSpPr>
+        </p:nvPicPr>
+        <p:blipFill>
+          <a:blip r:embed="rId3"/>
+          <a:stretch>
+            <a:fillRect/>
+          </a:stretch>
+        </p:blipFill>
         <p:spPr>
           <a:xfrm>
-            <a:off x="3000364" y="4214818"/>
-            <a:ext cx="1857388" cy="285752"/>
+            <a:off x="467544" y="1412776"/>
+            <a:ext cx="4591958" cy="2736304"/>
           </a:xfrm>
           <a:prstGeom prst="rect">
             <a:avLst/>
           </a:prstGeom>
         </p:spPr>
-        <p:txBody>
-          <a:bodyPr vert="horz" lIns="91440" tIns="45720" rIns="91440" bIns="45720" rtlCol="0">
-            <a:normAutofit lnSpcReduction="10000"/>
-          </a:bodyPr>
-          <a:lstStyle/>
-          <a:p>
-            <a:pPr marL="342900" marR="0" lvl="0" indent="-342900" algn="l" defTabSz="914400" rtl="0" eaLnBrk="1" fontAlgn="auto" latinLnBrk="0" hangingPunct="1">
-              <a:lnSpc>
-                <a:spcPct val="100000"/>
-              </a:lnSpc>
-              <a:spcBef>
-                <a:spcPct val="20000"/>
-              </a:spcBef>
-              <a:spcAft>
-                <a:spcPts val="0"/>
-              </a:spcAft>
-              <a:buClrTx/>
-              <a:buSzTx/>
-              <a:tabLst/>
-              <a:defRPr/>
-            </a:pPr>
-            <a:r>
-              <a:rPr lang="fr-CH" sz="1400" i="1" dirty="0" smtClean="0"/>
-              <a:t>Voir exemple « dc_2 »</a:t>
-            </a:r>
-            <a:endParaRPr kumimoji="0" lang="fr-CH" sz="1400" b="0" i="1" u="none" strike="noStrike" kern="1200" cap="none" spc="0" normalizeH="0" baseline="0" noProof="0" dirty="0">
-              <a:ln>
-                <a:noFill/>
-              </a:ln>
-              <a:solidFill>
-                <a:schemeClr val="tx1"/>
-              </a:solidFill>
-              <a:effectLst/>
-              <a:uLnTx/>
-              <a:uFillTx/>
-              <a:latin typeface="+mn-lt"/>
-              <a:ea typeface="+mn-ea"/>
-              <a:cs typeface="+mn-cs"/>
-            </a:endParaRPr>
-          </a:p>
-        </p:txBody>
-      </p:sp>
-      <p:pic>
-        <p:nvPicPr>
-          <p:cNvPr id="5122" name="Picture 2" descr="PlantUML diagram"/>
-          <p:cNvPicPr>
-            <a:picLocks noChangeAspect="1" noChangeArrowheads="1"/>
-          </p:cNvPicPr>
-          <p:nvPr/>
-        </p:nvPicPr>
-        <p:blipFill>
-          <a:blip r:embed="rId3"/>
-          <a:srcRect/>
-          <a:stretch>
-            <a:fillRect/>
-          </a:stretch>
-        </p:blipFill>
-        <p:spPr bwMode="auto">
-          <a:xfrm>
-            <a:off x="928662" y="1500174"/>
-            <a:ext cx="3317743" cy="1500198"/>
-          </a:xfrm>
-          <a:prstGeom prst="rect">
-            <a:avLst/>
-          </a:prstGeom>
-          <a:noFill/>
-        </p:spPr>
       </p:pic>
       <p:pic>
         <p:nvPicPr>
-          <p:cNvPr id="5126" name="Picture 6"/>
+          <p:cNvPr id="6" name="Picture 5"/>
           <p:cNvPicPr>
-            <a:picLocks noChangeAspect="1" noChangeArrowheads="1"/>
+            <a:picLocks noChangeAspect="1"/>
           </p:cNvPicPr>
           <p:nvPr/>
         </p:nvPicPr>
         <p:blipFill>
           <a:blip r:embed="rId4"/>
-          <a:srcRect/>
           <a:stretch>
             <a:fillRect/>
           </a:stretch>
         </p:blipFill>
-        <p:spPr bwMode="auto">
+        <p:spPr>
           <a:xfrm>
-            <a:off x="4500562" y="1357298"/>
-            <a:ext cx="4217973" cy="2786082"/>
+            <a:off x="3635896" y="1916832"/>
+            <a:ext cx="5000056" cy="792088"/>
           </a:xfrm>
           <a:prstGeom prst="rect">
             <a:avLst/>
           </a:prstGeom>
-          <a:noFill/>
-          <a:ln w="9525">
-            <a:noFill/>
-            <a:miter lim="800000"/>
-            <a:headEnd/>
-            <a:tailEnd/>
-          </a:ln>
-          <a:effectLst/>
         </p:spPr>
       </p:pic>
     </p:spTree>
@@ -4114,6 +3916,13 @@
   <p:clrMapOvr>
     <a:masterClrMapping/>
   </p:clrMapOvr>
+  <p:timing>
+    <p:tnLst>
+      <p:par>
+        <p:cTn xmlns:p14="http://schemas.microsoft.com/office/powerpoint/2010/main" id="1" dur="indefinite" restart="never" nodeType="tmRoot"/>
+      </p:par>
+    </p:tnLst>
+  </p:timing>
 </p:sld>
 </file>
 
@@ -4151,7 +3960,7 @@
           <a:p>
             <a:r>
               <a:rPr lang="fr-CH" dirty="0" smtClean="0"/>
-              <a:t>Rappel: les « accesseurs »</a:t>
+              <a:t>Exercice - 1</a:t>
             </a:r>
             <a:endParaRPr lang="fr-CH" dirty="0"/>
           </a:p>
@@ -4159,213 +3968,45 @@
       </p:sp>
       <p:sp>
         <p:nvSpPr>
-          <p:cNvPr id="7" name="Espace réservé du contenu 2"/>
-          <p:cNvSpPr txBox="1">
-            <a:spLocks/>
-          </p:cNvSpPr>
-          <p:nvPr/>
-        </p:nvSpPr>
-        <p:spPr>
-          <a:xfrm>
-            <a:off x="3286116" y="6000768"/>
-            <a:ext cx="1857388" cy="285752"/>
-          </a:xfrm>
-          <a:prstGeom prst="rect">
-            <a:avLst/>
-          </a:prstGeom>
-        </p:spPr>
-        <p:txBody>
-          <a:bodyPr vert="horz" lIns="91440" tIns="45720" rIns="91440" bIns="45720" rtlCol="0">
-            <a:normAutofit lnSpcReduction="10000"/>
-          </a:bodyPr>
-          <a:lstStyle/>
-          <a:p>
-            <a:pPr marL="342900" marR="0" lvl="0" indent="-342900" algn="l" defTabSz="914400" rtl="0" eaLnBrk="1" fontAlgn="auto" latinLnBrk="0" hangingPunct="1">
-              <a:lnSpc>
-                <a:spcPct val="100000"/>
-              </a:lnSpc>
-              <a:spcBef>
-                <a:spcPct val="20000"/>
-              </a:spcBef>
-              <a:spcAft>
-                <a:spcPts val="0"/>
-              </a:spcAft>
-              <a:buClrTx/>
-              <a:buSzTx/>
-              <a:tabLst/>
-              <a:defRPr/>
-            </a:pPr>
-            <a:r>
-              <a:rPr lang="fr-CH" sz="1400" i="1" dirty="0" smtClean="0"/>
-              <a:t>Voir exemple </a:t>
-            </a:r>
-            <a:r>
-              <a:rPr lang="fr-CH" sz="1400" i="1" dirty="0" smtClean="0"/>
-              <a:t>«dc_3»</a:t>
-            </a:r>
-            <a:endParaRPr kumimoji="0" lang="fr-CH" sz="1400" b="0" i="1" u="none" strike="noStrike" kern="1200" cap="none" spc="0" normalizeH="0" baseline="0" noProof="0" dirty="0">
-              <a:ln>
-                <a:noFill/>
-              </a:ln>
-              <a:solidFill>
-                <a:schemeClr val="tx1"/>
-              </a:solidFill>
-              <a:effectLst/>
-              <a:uLnTx/>
-              <a:uFillTx/>
-              <a:latin typeface="+mn-lt"/>
-              <a:ea typeface="+mn-ea"/>
-              <a:cs typeface="+mn-cs"/>
-            </a:endParaRPr>
-          </a:p>
-        </p:txBody>
-      </p:sp>
-      <p:pic>
-        <p:nvPicPr>
-          <p:cNvPr id="4099" name="Picture 3"/>
-          <p:cNvPicPr>
-            <a:picLocks noChangeAspect="1" noChangeArrowheads="1"/>
-          </p:cNvPicPr>
-          <p:nvPr/>
-        </p:nvPicPr>
-        <p:blipFill>
-          <a:blip r:embed="rId2"/>
-          <a:srcRect/>
-          <a:stretch>
-            <a:fillRect/>
-          </a:stretch>
-        </p:blipFill>
-        <p:spPr bwMode="auto">
-          <a:xfrm>
-            <a:off x="1142976" y="1285860"/>
-            <a:ext cx="6171435" cy="4572032"/>
-          </a:xfrm>
-          <a:prstGeom prst="rect">
-            <a:avLst/>
-          </a:prstGeom>
-          <a:noFill/>
-          <a:ln w="9525">
-            <a:noFill/>
-            <a:miter lim="800000"/>
-            <a:headEnd/>
-            <a:tailEnd/>
-          </a:ln>
-          <a:effectLst/>
-        </p:spPr>
-      </p:pic>
+          <p:cNvPr id="3" name="Espace réservé du contenu 2"/>
+          <p:cNvSpPr>
+            <a:spLocks noGrp="1"/>
+          </p:cNvSpPr>
+          <p:nvPr>
+            <p:ph idx="1"/>
+          </p:nvPr>
+        </p:nvSpPr>
+        <p:spPr/>
+        <p:txBody>
+          <a:bodyPr/>
+          <a:lstStyle/>
+          <a:p>
+            <a:r>
+              <a:rPr lang="fr-CH" dirty="0" smtClean="0"/>
+              <a:t>Continuez l’exemple une hierarchie de classes représentant les différentes opérations de SMSPay</a:t>
+            </a:r>
+          </a:p>
+          <a:p>
+            <a:r>
+              <a:rPr lang="fr-CH" dirty="0" smtClean="0"/>
+              <a:t>PlantUML &amp; JAVA</a:t>
+            </a:r>
+            <a:endParaRPr lang="fr-CH" dirty="0" smtClean="0"/>
+          </a:p>
+        </p:txBody>
+      </p:sp>
     </p:spTree>
   </p:cSld>
   <p:clrMapOvr>
     <a:masterClrMapping/>
   </p:clrMapOvr>
-</p:sld>
-</file>
-
-<file path=ppt/slides/slide5.xml><?xml version="1.0" encoding="utf-8"?>
-<p:sld xmlns:a="http://schemas.openxmlformats.org/drawingml/2006/main" xmlns:r="http://schemas.openxmlformats.org/officeDocument/2006/relationships" xmlns:p="http://schemas.openxmlformats.org/presentationml/2006/main">
-  <p:cSld>
-    <p:spTree>
-      <p:nvGrpSpPr>
-        <p:cNvPr id="1" name=""/>
-        <p:cNvGrpSpPr/>
-        <p:nvPr/>
-      </p:nvGrpSpPr>
-      <p:grpSpPr>
-        <a:xfrm>
-          <a:off x="0" y="0"/>
-          <a:ext cx="0" cy="0"/>
-          <a:chOff x="0" y="0"/>
-          <a:chExt cx="0" cy="0"/>
-        </a:xfrm>
-      </p:grpSpPr>
-      <p:sp>
-        <p:nvSpPr>
-          <p:cNvPr id="2" name="Titre 1"/>
-          <p:cNvSpPr>
-            <a:spLocks noGrp="1"/>
-          </p:cNvSpPr>
-          <p:nvPr>
-            <p:ph type="title"/>
-          </p:nvPr>
-        </p:nvSpPr>
-        <p:spPr/>
-        <p:txBody>
-          <a:bodyPr/>
-          <a:lstStyle/>
-          <a:p>
-            <a:r>
-              <a:rPr lang="fr-CH" dirty="0" smtClean="0"/>
-              <a:t>Exercice - 1</a:t>
-            </a:r>
-            <a:endParaRPr lang="fr-CH" dirty="0"/>
-          </a:p>
-        </p:txBody>
-      </p:sp>
-      <p:sp>
-        <p:nvSpPr>
-          <p:cNvPr id="3" name="Espace réservé du contenu 2"/>
-          <p:cNvSpPr>
-            <a:spLocks noGrp="1"/>
-          </p:cNvSpPr>
-          <p:nvPr>
-            <p:ph idx="1"/>
-          </p:nvPr>
-        </p:nvSpPr>
-        <p:spPr/>
-        <p:txBody>
-          <a:bodyPr/>
-          <a:lstStyle/>
-          <a:p>
-            <a:r>
-              <a:rPr lang="fr-CH" dirty="0" smtClean="0"/>
-              <a:t>Reprendre Exercice 2 de la leçon 1</a:t>
-            </a:r>
-          </a:p>
-          <a:p>
-            <a:r>
-              <a:rPr lang="fr-CH" dirty="0" smtClean="0"/>
-              <a:t>Rajouter des accesseurs aux classes Client et SMS</a:t>
-            </a:r>
-          </a:p>
-          <a:p>
-            <a:r>
-              <a:rPr lang="fr-CH" dirty="0" smtClean="0"/>
-              <a:t>Rajouter également une méthode </a:t>
-            </a:r>
-            <a:r>
-              <a:rPr lang="fr-CH" dirty="0" err="1" smtClean="0"/>
-              <a:t>toString</a:t>
-            </a:r>
-            <a:r>
-              <a:rPr lang="fr-CH" dirty="0" smtClean="0"/>
-              <a:t>:</a:t>
-            </a:r>
-          </a:p>
-          <a:p>
-            <a:pPr lvl="1">
-              <a:buNone/>
-            </a:pPr>
-            <a:r>
-              <a:rPr lang="fr-CH" dirty="0" smtClean="0"/>
-              <a:t>+</a:t>
-            </a:r>
-            <a:r>
-              <a:rPr lang="fr-CH" dirty="0" err="1" smtClean="0"/>
-              <a:t>toString</a:t>
-            </a:r>
-            <a:r>
-              <a:rPr lang="fr-CH" dirty="0" smtClean="0"/>
-              <a:t>():String</a:t>
-            </a:r>
-            <a:endParaRPr lang="fr-CH" dirty="0" smtClean="0"/>
-          </a:p>
-        </p:txBody>
-      </p:sp>
-    </p:spTree>
-  </p:cSld>
-  <p:clrMapOvr>
-    <a:masterClrMapping/>
-  </p:clrMapOvr>
+  <p:timing>
+    <p:tnLst>
+      <p:par>
+        <p:cTn xmlns:p14="http://schemas.microsoft.com/office/powerpoint/2010/main" id="1" dur="indefinite" restart="never" nodeType="tmRoot"/>
+      </p:par>
+    </p:tnLst>
+  </p:timing>
 </p:sld>
 </file>
 

</xml_diff>